<commit_message>
adding WIP code for S3 bucket support
</commit_message>
<xml_diff>
--- a/docs/source/_static/seedfarmer_diagrams.pptx
+++ b/docs/source/_static/seedfarmer_diagrams.pptx
@@ -262,7 +262,7 @@
           <a:p>
             <a:fld id="{998E45E6-B312-6A49-8978-08F051C8B1F2}" type="datetimeFigureOut">
               <a:rPr lang="en-US" smtClean="0"/>
-              <a:t>9/23/22</a:t>
+              <a:t>5/14/24</a:t>
             </a:fld>
             <a:endParaRPr lang="en-US"/>
           </a:p>
@@ -460,7 +460,7 @@
           <a:p>
             <a:fld id="{998E45E6-B312-6A49-8978-08F051C8B1F2}" type="datetimeFigureOut">
               <a:rPr lang="en-US" smtClean="0"/>
-              <a:t>9/23/22</a:t>
+              <a:t>5/14/24</a:t>
             </a:fld>
             <a:endParaRPr lang="en-US"/>
           </a:p>
@@ -668,7 +668,7 @@
           <a:p>
             <a:fld id="{998E45E6-B312-6A49-8978-08F051C8B1F2}" type="datetimeFigureOut">
               <a:rPr lang="en-US" smtClean="0"/>
-              <a:t>9/23/22</a:t>
+              <a:t>5/14/24</a:t>
             </a:fld>
             <a:endParaRPr lang="en-US"/>
           </a:p>
@@ -1107,7 +1107,7 @@
           <a:p>
             <a:fld id="{998E45E6-B312-6A49-8978-08F051C8B1F2}" type="datetimeFigureOut">
               <a:rPr lang="en-US" smtClean="0"/>
-              <a:t>9/23/22</a:t>
+              <a:t>5/14/24</a:t>
             </a:fld>
             <a:endParaRPr lang="en-US"/>
           </a:p>
@@ -1382,7 +1382,7 @@
           <a:p>
             <a:fld id="{998E45E6-B312-6A49-8978-08F051C8B1F2}" type="datetimeFigureOut">
               <a:rPr lang="en-US" smtClean="0"/>
-              <a:t>9/23/22</a:t>
+              <a:t>5/14/24</a:t>
             </a:fld>
             <a:endParaRPr lang="en-US"/>
           </a:p>
@@ -1647,7 +1647,7 @@
           <a:p>
             <a:fld id="{998E45E6-B312-6A49-8978-08F051C8B1F2}" type="datetimeFigureOut">
               <a:rPr lang="en-US" smtClean="0"/>
-              <a:t>9/23/22</a:t>
+              <a:t>5/14/24</a:t>
             </a:fld>
             <a:endParaRPr lang="en-US"/>
           </a:p>
@@ -2059,7 +2059,7 @@
           <a:p>
             <a:fld id="{998E45E6-B312-6A49-8978-08F051C8B1F2}" type="datetimeFigureOut">
               <a:rPr lang="en-US" smtClean="0"/>
-              <a:t>9/23/22</a:t>
+              <a:t>5/14/24</a:t>
             </a:fld>
             <a:endParaRPr lang="en-US"/>
           </a:p>
@@ -2200,7 +2200,7 @@
           <a:p>
             <a:fld id="{998E45E6-B312-6A49-8978-08F051C8B1F2}" type="datetimeFigureOut">
               <a:rPr lang="en-US" smtClean="0"/>
-              <a:t>9/23/22</a:t>
+              <a:t>5/14/24</a:t>
             </a:fld>
             <a:endParaRPr lang="en-US"/>
           </a:p>
@@ -2313,7 +2313,7 @@
           <a:p>
             <a:fld id="{998E45E6-B312-6A49-8978-08F051C8B1F2}" type="datetimeFigureOut">
               <a:rPr lang="en-US" smtClean="0"/>
-              <a:t>9/23/22</a:t>
+              <a:t>5/14/24</a:t>
             </a:fld>
             <a:endParaRPr lang="en-US"/>
           </a:p>
@@ -2624,7 +2624,7 @@
           <a:p>
             <a:fld id="{998E45E6-B312-6A49-8978-08F051C8B1F2}" type="datetimeFigureOut">
               <a:rPr lang="en-US" smtClean="0"/>
-              <a:t>9/23/22</a:t>
+              <a:t>5/14/24</a:t>
             </a:fld>
             <a:endParaRPr lang="en-US"/>
           </a:p>
@@ -2912,7 +2912,7 @@
           <a:p>
             <a:fld id="{998E45E6-B312-6A49-8978-08F051C8B1F2}" type="datetimeFigureOut">
               <a:rPr lang="en-US" smtClean="0"/>
-              <a:t>9/23/22</a:t>
+              <a:t>5/14/24</a:t>
             </a:fld>
             <a:endParaRPr lang="en-US"/>
           </a:p>
@@ -3153,7 +3153,7 @@
           <a:p>
             <a:fld id="{998E45E6-B312-6A49-8978-08F051C8B1F2}" type="datetimeFigureOut">
               <a:rPr lang="en-US" smtClean="0"/>
-              <a:t>9/23/22</a:t>
+              <a:t>5/14/24</a:t>
             </a:fld>
             <a:endParaRPr lang="en-US"/>
           </a:p>
@@ -5982,7 +5982,7 @@
           <a:p>
             <a:pPr algn="ctr" eaLnBrk="1" hangingPunct="1"/>
             <a:r>
-              <a:rPr lang="en-US" altLang="en-US" dirty="0" err="1">
+              <a:rPr lang="en-US" altLang="en-US" dirty="0">
                 <a:solidFill>
                   <a:srgbClr val="000000"/>
                 </a:solidFill>
@@ -5991,13 +5991,6 @@
               </a:rPr>
               <a:t>SeedFarmer</a:t>
             </a:r>
-            <a:endParaRPr lang="en-US" altLang="en-US" dirty="0">
-              <a:solidFill>
-                <a:srgbClr val="000000"/>
-              </a:solidFill>
-              <a:latin typeface="Arial" panose="020B0604020202020204" pitchFamily="34" charset="0"/>
-              <a:cs typeface="Arial" panose="020B0604020202020204" pitchFamily="34" charset="0"/>
-            </a:endParaRPr>
           </a:p>
         </p:txBody>
       </p:sp>
@@ -6825,25 +6818,8 @@
                 <a:latin typeface="Arial" panose="020B0604020202020204" pitchFamily="34" charset="0"/>
                 <a:cs typeface="Arial" panose="020B0604020202020204" pitchFamily="34" charset="0"/>
               </a:rPr>
-              <a:t>AWS </a:t>
+              <a:t>AWS CodeSeeder</a:t>
             </a:r>
-            <a:r>
-              <a:rPr lang="en-US" altLang="en-US" dirty="0" err="1">
-                <a:solidFill>
-                  <a:srgbClr val="000000"/>
-                </a:solidFill>
-                <a:latin typeface="Arial" panose="020B0604020202020204" pitchFamily="34" charset="0"/>
-                <a:cs typeface="Arial" panose="020B0604020202020204" pitchFamily="34" charset="0"/>
-              </a:rPr>
-              <a:t>CodeSeeder</a:t>
-            </a:r>
-            <a:endParaRPr lang="en-US" altLang="en-US" dirty="0">
-              <a:solidFill>
-                <a:srgbClr val="000000"/>
-              </a:solidFill>
-              <a:latin typeface="Arial" panose="020B0604020202020204" pitchFamily="34" charset="0"/>
-              <a:cs typeface="Arial" panose="020B0604020202020204" pitchFamily="34" charset="0"/>
-            </a:endParaRPr>
           </a:p>
         </p:txBody>
       </p:sp>
@@ -7422,8 +7398,8 @@
         </p:nvSpPr>
         <p:spPr>
           <a:xfrm>
-            <a:off x="5204908" y="4486519"/>
-            <a:ext cx="5846241" cy="1827275"/>
+            <a:off x="4157536" y="4486519"/>
+            <a:ext cx="6893613" cy="1827275"/>
           </a:xfrm>
           <a:prstGeom prst="rect">
             <a:avLst/>
@@ -8650,6 +8626,225 @@
                 </a:solidFill>
               </a:rPr>
               <a:t>2</a:t>
+            </a:r>
+          </a:p>
+        </p:txBody>
+      </p:sp>
+      <p:pic>
+        <p:nvPicPr>
+          <p:cNvPr id="2" name="Graphic 8" descr="Amazon Simple Storage Service (Amazon S3) service icon.">
+            <a:extLst>
+              <a:ext uri="{FF2B5EF4-FFF2-40B4-BE49-F238E27FC236}">
+                <a16:creationId xmlns:a16="http://schemas.microsoft.com/office/drawing/2014/main" id="{F57351E8-082F-B715-A083-471CF8CB9634}"/>
+              </a:ext>
+            </a:extLst>
+          </p:cNvPr>
+          <p:cNvPicPr>
+            <a:picLocks noChangeAspect="1" noChangeArrowheads="1"/>
+          </p:cNvPicPr>
+          <p:nvPr/>
+        </p:nvPicPr>
+        <p:blipFill>
+          <a:blip r:embed="rId14">
+            <a:extLst>
+              <a:ext uri="{96DAC541-7B7A-43D3-8B79-37D633B846F1}">
+                <asvg:svgBlip xmlns:asvg="http://schemas.microsoft.com/office/drawing/2016/SVG/main" r:embed="rId15"/>
+              </a:ext>
+            </a:extLst>
+          </a:blip>
+          <a:srcRect/>
+          <a:stretch/>
+        </p:blipFill>
+        <p:spPr bwMode="auto">
+          <a:xfrm>
+            <a:off x="4397602" y="4605293"/>
+            <a:ext cx="461416" cy="461416"/>
+          </a:xfrm>
+          <a:prstGeom prst="rect">
+            <a:avLst/>
+          </a:prstGeom>
+          <a:noFill/>
+          <a:ln>
+            <a:noFill/>
+          </a:ln>
+          <a:extLst>
+            <a:ext uri="{909E8E84-426E-40DD-AFC4-6F175D3DCCD1}">
+              <a14:hiddenFill xmlns:a14="http://schemas.microsoft.com/office/drawing/2010/main">
+                <a:solidFill>
+                  <a:srgbClr val="FFFFFF"/>
+                </a:solidFill>
+              </a14:hiddenFill>
+            </a:ext>
+            <a:ext uri="{91240B29-F687-4F45-9708-019B960494DF}">
+              <a14:hiddenLine xmlns:a14="http://schemas.microsoft.com/office/drawing/2010/main" w="9525">
+                <a:solidFill>
+                  <a:srgbClr val="000000"/>
+                </a:solidFill>
+                <a:miter lim="800000"/>
+                <a:headEnd/>
+                <a:tailEnd/>
+              </a14:hiddenLine>
+            </a:ext>
+          </a:extLst>
+        </p:spPr>
+      </p:pic>
+      <p:sp>
+        <p:nvSpPr>
+          <p:cNvPr id="19" name="TextBox 12">
+            <a:extLst>
+              <a:ext uri="{FF2B5EF4-FFF2-40B4-BE49-F238E27FC236}">
+                <a16:creationId xmlns:a16="http://schemas.microsoft.com/office/drawing/2014/main" id="{AC1A855C-FCDC-4BDF-ADC1-98D89D95F76F}"/>
+              </a:ext>
+            </a:extLst>
+          </p:cNvPr>
+          <p:cNvSpPr txBox="1">
+            <a:spLocks noChangeArrowheads="1"/>
+          </p:cNvSpPr>
+          <p:nvPr/>
+        </p:nvSpPr>
+        <p:spPr bwMode="auto">
+          <a:xfrm>
+            <a:off x="4315131" y="5201712"/>
+            <a:ext cx="653015" cy="369332"/>
+          </a:xfrm>
+          <a:prstGeom prst="rect">
+            <a:avLst/>
+          </a:prstGeom>
+          <a:noFill/>
+          <a:ln>
+            <a:noFill/>
+          </a:ln>
+          <a:extLst>
+            <a:ext uri="{909E8E84-426E-40DD-AFC4-6F175D3DCCD1}">
+              <a14:hiddenFill xmlns:a14="http://schemas.microsoft.com/office/drawing/2010/main">
+                <a:solidFill>
+                  <a:srgbClr val="FFFFFF"/>
+                </a:solidFill>
+              </a14:hiddenFill>
+            </a:ext>
+            <a:ext uri="{91240B29-F687-4F45-9708-019B960494DF}">
+              <a14:hiddenLine xmlns:a14="http://schemas.microsoft.com/office/drawing/2010/main" w="9525">
+                <a:solidFill>
+                  <a:srgbClr val="000000"/>
+                </a:solidFill>
+                <a:miter lim="800000"/>
+                <a:headEnd/>
+                <a:tailEnd/>
+              </a14:hiddenLine>
+            </a:ext>
+          </a:extLst>
+        </p:spPr>
+        <p:txBody>
+          <a:bodyPr wrap="square">
+            <a:spAutoFit/>
+          </a:bodyPr>
+          <a:lstStyle>
+            <a:lvl1pPr>
+              <a:defRPr>
+                <a:solidFill>
+                  <a:schemeClr val="tx1"/>
+                </a:solidFill>
+                <a:latin typeface="Calibri" panose="020F0502020204030204" pitchFamily="34" charset="0"/>
+              </a:defRPr>
+            </a:lvl1pPr>
+            <a:lvl2pPr marL="742950" indent="-285750">
+              <a:defRPr>
+                <a:solidFill>
+                  <a:schemeClr val="tx1"/>
+                </a:solidFill>
+                <a:latin typeface="Calibri" panose="020F0502020204030204" pitchFamily="34" charset="0"/>
+              </a:defRPr>
+            </a:lvl2pPr>
+            <a:lvl3pPr marL="1143000" indent="-228600">
+              <a:defRPr>
+                <a:solidFill>
+                  <a:schemeClr val="tx1"/>
+                </a:solidFill>
+                <a:latin typeface="Calibri" panose="020F0502020204030204" pitchFamily="34" charset="0"/>
+              </a:defRPr>
+            </a:lvl3pPr>
+            <a:lvl4pPr marL="1600200" indent="-228600">
+              <a:defRPr>
+                <a:solidFill>
+                  <a:schemeClr val="tx1"/>
+                </a:solidFill>
+                <a:latin typeface="Calibri" panose="020F0502020204030204" pitchFamily="34" charset="0"/>
+              </a:defRPr>
+            </a:lvl4pPr>
+            <a:lvl5pPr marL="2057400" indent="-228600">
+              <a:defRPr>
+                <a:solidFill>
+                  <a:schemeClr val="tx1"/>
+                </a:solidFill>
+                <a:latin typeface="Calibri" panose="020F0502020204030204" pitchFamily="34" charset="0"/>
+              </a:defRPr>
+            </a:lvl5pPr>
+            <a:lvl6pPr marL="2514600" indent="-228600" eaLnBrk="0" fontAlgn="base" hangingPunct="0">
+              <a:spcBef>
+                <a:spcPct val="0"/>
+              </a:spcBef>
+              <a:spcAft>
+                <a:spcPct val="0"/>
+              </a:spcAft>
+              <a:defRPr>
+                <a:solidFill>
+                  <a:schemeClr val="tx1"/>
+                </a:solidFill>
+                <a:latin typeface="Calibri" panose="020F0502020204030204" pitchFamily="34" charset="0"/>
+              </a:defRPr>
+            </a:lvl6pPr>
+            <a:lvl7pPr marL="2971800" indent="-228600" eaLnBrk="0" fontAlgn="base" hangingPunct="0">
+              <a:spcBef>
+                <a:spcPct val="0"/>
+              </a:spcBef>
+              <a:spcAft>
+                <a:spcPct val="0"/>
+              </a:spcAft>
+              <a:defRPr>
+                <a:solidFill>
+                  <a:schemeClr val="tx1"/>
+                </a:solidFill>
+                <a:latin typeface="Calibri" panose="020F0502020204030204" pitchFamily="34" charset="0"/>
+              </a:defRPr>
+            </a:lvl7pPr>
+            <a:lvl8pPr marL="3429000" indent="-228600" eaLnBrk="0" fontAlgn="base" hangingPunct="0">
+              <a:spcBef>
+                <a:spcPct val="0"/>
+              </a:spcBef>
+              <a:spcAft>
+                <a:spcPct val="0"/>
+              </a:spcAft>
+              <a:defRPr>
+                <a:solidFill>
+                  <a:schemeClr val="tx1"/>
+                </a:solidFill>
+                <a:latin typeface="Calibri" panose="020F0502020204030204" pitchFamily="34" charset="0"/>
+              </a:defRPr>
+            </a:lvl8pPr>
+            <a:lvl9pPr marL="3886200" indent="-228600" eaLnBrk="0" fontAlgn="base" hangingPunct="0">
+              <a:spcBef>
+                <a:spcPct val="0"/>
+              </a:spcBef>
+              <a:spcAft>
+                <a:spcPct val="0"/>
+              </a:spcAft>
+              <a:defRPr>
+                <a:solidFill>
+                  <a:schemeClr val="tx1"/>
+                </a:solidFill>
+                <a:latin typeface="Calibri" panose="020F0502020204030204" pitchFamily="34" charset="0"/>
+              </a:defRPr>
+            </a:lvl9pPr>
+          </a:lstStyle>
+          <a:p>
+            <a:pPr algn="ctr" eaLnBrk="1" hangingPunct="1"/>
+            <a:r>
+              <a:rPr lang="en-US" altLang="en-US" dirty="0">
+                <a:latin typeface="Arial" panose="020B0604020202020204" pitchFamily="34" charset="0"/>
+                <a:ea typeface="Amazon Ember" panose="020B0603020204020204" pitchFamily="34" charset="0"/>
+                <a:cs typeface="Arial" panose="020B0604020202020204" pitchFamily="34" charset="0"/>
+              </a:rPr>
+              <a:t>S3</a:t>
             </a:r>
           </a:p>
         </p:txBody>

</xml_diff>